<commit_message>
update data collection page in ppt
</commit_message>
<xml_diff>
--- a/proposal/NC Census Data analysis 10-06.pptx
+++ b/proposal/NC Census Data analysis 10-06.pptx
@@ -5,7 +5,7 @@
     <p:sldMasterId id="2147483740" r:id="rId4"/>
   </p:sldMasterIdLst>
   <p:notesMasterIdLst>
-    <p:notesMasterId r:id="rId13"/>
+    <p:notesMasterId r:id="rId15"/>
   </p:notesMasterIdLst>
   <p:sldIdLst>
     <p:sldId id="257" r:id="rId5"/>
@@ -16,6 +16,8 @@
     <p:sldId id="272" r:id="rId10"/>
     <p:sldId id="267" r:id="rId11"/>
     <p:sldId id="266" r:id="rId12"/>
+    <p:sldId id="274" r:id="rId13"/>
+    <p:sldId id="273" r:id="rId14"/>
   </p:sldIdLst>
   <p:sldSz cx="12192000" cy="6858000"/>
   <p:notesSz cx="6858000" cy="9144000"/>
@@ -204,7 +206,7 @@
           <a:p>
             <a:fld id="{E1D941E9-C117-4952-8368-6FB7EE4AE216}" type="datetimeFigureOut">
               <a:rPr lang="en-US" smtClean="0"/>
-              <a:t>10/8/2020</a:t>
+              <a:t>10/8/20</a:t>
             </a:fld>
             <a:endParaRPr lang="en-US"/>
           </a:p>
@@ -630,6 +632,620 @@
           <a:bodyPr/>
           <a:lstStyle/>
           <a:p>
+            <a:r>
+              <a:rPr lang="en-US" sz="1200" kern="1200" dirty="0">
+                <a:solidFill>
+                  <a:schemeClr val="tx1"/>
+                </a:solidFill>
+                <a:effectLst/>
+                <a:latin typeface="+mn-lt"/>
+                <a:ea typeface="+mn-ea"/>
+                <a:cs typeface="+mn-cs"/>
+              </a:rPr>
+              <a:t>We collected data for these years. But, 2 days ago, I got an email of this. The </a:t>
+            </a:r>
+            <a:r>
+              <a:rPr lang="en-US" sz="1200" kern="1200" dirty="0" err="1">
+                <a:solidFill>
+                  <a:schemeClr val="tx1"/>
+                </a:solidFill>
+                <a:effectLst/>
+                <a:latin typeface="+mn-lt"/>
+                <a:ea typeface="+mn-ea"/>
+                <a:cs typeface="+mn-cs"/>
+              </a:rPr>
+              <a:t>api</a:t>
+            </a:r>
+            <a:r>
+              <a:rPr lang="en-US" sz="1200" kern="1200" dirty="0">
+                <a:solidFill>
+                  <a:schemeClr val="tx1"/>
+                </a:solidFill>
+                <a:effectLst/>
+                <a:latin typeface="+mn-lt"/>
+                <a:ea typeface="+mn-ea"/>
+                <a:cs typeface="+mn-cs"/>
+              </a:rPr>
+              <a:t> calls of two years do not work right now, so we had to delete these years from our page. </a:t>
+            </a:r>
+          </a:p>
+          <a:p>
+            <a:r>
+              <a:rPr lang="en-US" sz="1200" kern="1200" dirty="0">
+                <a:solidFill>
+                  <a:schemeClr val="tx1"/>
+                </a:solidFill>
+                <a:effectLst/>
+                <a:latin typeface="+mn-lt"/>
+                <a:ea typeface="+mn-ea"/>
+                <a:cs typeface="+mn-cs"/>
+              </a:rPr>
+              <a:t>(The dropdown selection provides from 2012 to 2018.)</a:t>
+            </a:r>
+          </a:p>
+          <a:p>
+            <a:endParaRPr lang="en-US" sz="1200" kern="1200" dirty="0">
+              <a:solidFill>
+                <a:schemeClr val="tx1"/>
+              </a:solidFill>
+              <a:effectLst/>
+              <a:latin typeface="+mn-lt"/>
+              <a:ea typeface="+mn-ea"/>
+              <a:cs typeface="+mn-cs"/>
+            </a:endParaRPr>
+          </a:p>
+          <a:p>
+            <a:r>
+              <a:rPr lang="en-US" sz="1200" kern="1200" dirty="0">
+                <a:solidFill>
+                  <a:schemeClr val="tx1"/>
+                </a:solidFill>
+                <a:effectLst/>
+                <a:latin typeface="+mn-lt"/>
+                <a:ea typeface="+mn-ea"/>
+                <a:cs typeface="+mn-cs"/>
+              </a:rPr>
+              <a:t>[click]</a:t>
+            </a:r>
+          </a:p>
+          <a:p>
+            <a:r>
+              <a:rPr lang="en-US" sz="1200" kern="1200" dirty="0">
+                <a:solidFill>
+                  <a:schemeClr val="tx1"/>
+                </a:solidFill>
+                <a:effectLst/>
+                <a:latin typeface="+mn-lt"/>
+                <a:ea typeface="+mn-ea"/>
+                <a:cs typeface="+mn-cs"/>
+              </a:rPr>
+              <a:t>The county business pattern data was collected from census dot gov through </a:t>
+            </a:r>
+            <a:r>
+              <a:rPr lang="en-US" sz="1200" kern="1200" dirty="0" err="1">
+                <a:solidFill>
+                  <a:schemeClr val="tx1"/>
+                </a:solidFill>
+                <a:effectLst/>
+                <a:latin typeface="+mn-lt"/>
+                <a:ea typeface="+mn-ea"/>
+                <a:cs typeface="+mn-cs"/>
+              </a:rPr>
+              <a:t>api</a:t>
+            </a:r>
+            <a:r>
+              <a:rPr lang="en-US" sz="1200" kern="1200" dirty="0">
+                <a:solidFill>
+                  <a:schemeClr val="tx1"/>
+                </a:solidFill>
+                <a:effectLst/>
+                <a:latin typeface="+mn-lt"/>
+                <a:ea typeface="+mn-ea"/>
+                <a:cs typeface="+mn-cs"/>
+              </a:rPr>
+              <a:t> calls.</a:t>
+            </a:r>
+          </a:p>
+          <a:p>
+            <a:r>
+              <a:rPr lang="en-US" sz="1200" kern="1200" dirty="0">
+                <a:solidFill>
+                  <a:schemeClr val="tx1"/>
+                </a:solidFill>
+                <a:effectLst/>
+                <a:latin typeface="+mn-lt"/>
+                <a:ea typeface="+mn-ea"/>
+                <a:cs typeface="+mn-cs"/>
+              </a:rPr>
+              <a:t>[click the box (left)], This data provide employee numbers for each business sector of each county. [click the right box] Each year, there are about 1500 rows.</a:t>
+            </a:r>
+          </a:p>
+          <a:p>
+            <a:endParaRPr lang="en-US" sz="1200" kern="1200" dirty="0">
+              <a:solidFill>
+                <a:schemeClr val="tx1"/>
+              </a:solidFill>
+              <a:effectLst/>
+              <a:latin typeface="+mn-lt"/>
+              <a:ea typeface="+mn-ea"/>
+              <a:cs typeface="+mn-cs"/>
+            </a:endParaRPr>
+          </a:p>
+          <a:p>
+            <a:r>
+              <a:rPr lang="en-US" sz="1200" kern="1200" dirty="0">
+                <a:solidFill>
+                  <a:schemeClr val="tx1"/>
+                </a:solidFill>
+                <a:effectLst/>
+                <a:latin typeface="+mn-lt"/>
+                <a:ea typeface="+mn-ea"/>
+                <a:cs typeface="+mn-cs"/>
+              </a:rPr>
+              <a:t>[click]</a:t>
+            </a:r>
+          </a:p>
+          <a:p>
+            <a:r>
+              <a:rPr lang="en-US" sz="1200" kern="1200" dirty="0">
+                <a:solidFill>
+                  <a:schemeClr val="tx1"/>
+                </a:solidFill>
+                <a:effectLst/>
+                <a:latin typeface="+mn-lt"/>
+                <a:ea typeface="+mn-ea"/>
+                <a:cs typeface="+mn-cs"/>
+              </a:rPr>
+              <a:t>For state-wide, we perform </a:t>
+            </a:r>
+            <a:r>
+              <a:rPr lang="en-US" sz="1200" kern="1200" dirty="0" err="1">
+                <a:solidFill>
+                  <a:schemeClr val="tx1"/>
+                </a:solidFill>
+                <a:effectLst/>
+                <a:latin typeface="+mn-lt"/>
+                <a:ea typeface="+mn-ea"/>
+                <a:cs typeface="+mn-cs"/>
+              </a:rPr>
+              <a:t>api</a:t>
+            </a:r>
+            <a:r>
+              <a:rPr lang="en-US" sz="1200" kern="1200" dirty="0">
+                <a:solidFill>
+                  <a:schemeClr val="tx1"/>
+                </a:solidFill>
+                <a:effectLst/>
+                <a:latin typeface="+mn-lt"/>
+                <a:ea typeface="+mn-ea"/>
+                <a:cs typeface="+mn-cs"/>
+              </a:rPr>
+              <a:t> calls separately because the county data do not include state-wide numbers or,  existing data was not correct. </a:t>
+            </a:r>
+          </a:p>
+          <a:p>
+            <a:endParaRPr lang="en-US" sz="1200" kern="1200" dirty="0">
+              <a:solidFill>
+                <a:schemeClr val="tx1"/>
+              </a:solidFill>
+              <a:effectLst/>
+              <a:latin typeface="+mn-lt"/>
+              <a:ea typeface="+mn-ea"/>
+              <a:cs typeface="+mn-cs"/>
+            </a:endParaRPr>
+          </a:p>
+          <a:p>
+            <a:r>
+              <a:rPr lang="en-US" sz="1200" kern="1200" dirty="0">
+                <a:solidFill>
+                  <a:schemeClr val="tx1"/>
+                </a:solidFill>
+                <a:effectLst/>
+                <a:latin typeface="+mn-lt"/>
+                <a:ea typeface="+mn-ea"/>
+                <a:cs typeface="+mn-cs"/>
+              </a:rPr>
+              <a:t>[click]</a:t>
+            </a:r>
+          </a:p>
+          <a:p>
+            <a:r>
+              <a:rPr lang="en-US" sz="1200" kern="1200" dirty="0">
+                <a:solidFill>
+                  <a:schemeClr val="tx1"/>
+                </a:solidFill>
+                <a:effectLst/>
+                <a:latin typeface="+mn-lt"/>
+                <a:ea typeface="+mn-ea"/>
+                <a:cs typeface="+mn-cs"/>
+              </a:rPr>
+              <a:t>To see employment timeline, we performed </a:t>
+            </a:r>
+            <a:r>
+              <a:rPr lang="en-US" sz="1200" kern="1200" dirty="0" err="1">
+                <a:solidFill>
+                  <a:schemeClr val="tx1"/>
+                </a:solidFill>
+                <a:effectLst/>
+                <a:latin typeface="+mn-lt"/>
+                <a:ea typeface="+mn-ea"/>
+                <a:cs typeface="+mn-cs"/>
+              </a:rPr>
+              <a:t>api</a:t>
+            </a:r>
+            <a:r>
+              <a:rPr lang="en-US" sz="1200" kern="1200" dirty="0">
+                <a:solidFill>
+                  <a:schemeClr val="tx1"/>
+                </a:solidFill>
+                <a:effectLst/>
+                <a:latin typeface="+mn-lt"/>
+                <a:ea typeface="+mn-ea"/>
+                <a:cs typeface="+mn-cs"/>
+              </a:rPr>
+              <a:t> calls for early years too.</a:t>
+            </a:r>
+          </a:p>
+          <a:p>
+            <a:r>
+              <a:rPr lang="en-US" sz="1200" kern="1200" dirty="0">
+                <a:solidFill>
+                  <a:schemeClr val="tx1"/>
+                </a:solidFill>
+                <a:effectLst/>
+                <a:latin typeface="+mn-lt"/>
+                <a:ea typeface="+mn-ea"/>
+                <a:cs typeface="+mn-cs"/>
+              </a:rPr>
+              <a:t>[click] also, separate </a:t>
+            </a:r>
+            <a:r>
+              <a:rPr lang="en-US" sz="1200" kern="1200" dirty="0" err="1">
+                <a:solidFill>
+                  <a:schemeClr val="tx1"/>
+                </a:solidFill>
+                <a:effectLst/>
+                <a:latin typeface="+mn-lt"/>
+                <a:ea typeface="+mn-ea"/>
+                <a:cs typeface="+mn-cs"/>
+              </a:rPr>
+              <a:t>api</a:t>
+            </a:r>
+            <a:r>
+              <a:rPr lang="en-US" sz="1200" kern="1200" dirty="0">
+                <a:solidFill>
+                  <a:schemeClr val="tx1"/>
+                </a:solidFill>
+                <a:effectLst/>
+                <a:latin typeface="+mn-lt"/>
+                <a:ea typeface="+mn-ea"/>
+                <a:cs typeface="+mn-cs"/>
+              </a:rPr>
+              <a:t> calls for the state total number of employees.</a:t>
+            </a:r>
+          </a:p>
+          <a:p>
+            <a:endParaRPr lang="en-US" sz="1200" kern="1200" dirty="0">
+              <a:solidFill>
+                <a:schemeClr val="tx1"/>
+              </a:solidFill>
+              <a:effectLst/>
+              <a:latin typeface="+mn-lt"/>
+              <a:ea typeface="+mn-ea"/>
+              <a:cs typeface="+mn-cs"/>
+            </a:endParaRPr>
+          </a:p>
+          <a:p>
+            <a:r>
+              <a:rPr lang="en-US" sz="1200" kern="1200" dirty="0">
+                <a:solidFill>
+                  <a:schemeClr val="tx1"/>
+                </a:solidFill>
+                <a:effectLst/>
+                <a:latin typeface="+mn-lt"/>
+                <a:ea typeface="+mn-ea"/>
+                <a:cs typeface="+mn-cs"/>
+              </a:rPr>
+              <a:t>The query variables for the employment have changed over the years.</a:t>
+            </a:r>
+          </a:p>
+          <a:p>
+            <a:r>
+              <a:rPr lang="en-US" sz="1200" kern="1200" dirty="0">
+                <a:solidFill>
+                  <a:schemeClr val="tx1"/>
+                </a:solidFill>
+                <a:effectLst/>
+                <a:latin typeface="+mn-lt"/>
+                <a:ea typeface="+mn-ea"/>
+                <a:cs typeface="+mn-cs"/>
+              </a:rPr>
+              <a:t>[click the leftmost box]</a:t>
+            </a:r>
+          </a:p>
+          <a:p>
+            <a:r>
+              <a:rPr lang="en-US" sz="1200" kern="1200" dirty="0">
+                <a:solidFill>
+                  <a:schemeClr val="tx1"/>
+                </a:solidFill>
+                <a:effectLst/>
+                <a:latin typeface="+mn-lt"/>
+                <a:ea typeface="+mn-ea"/>
+                <a:cs typeface="+mn-cs"/>
+              </a:rPr>
+              <a:t>We had to deal with the different indices in combining the data.</a:t>
+            </a:r>
+          </a:p>
+          <a:p>
+            <a:endParaRPr lang="en-US" sz="1200" kern="1200" dirty="0">
+              <a:solidFill>
+                <a:schemeClr val="tx1"/>
+              </a:solidFill>
+              <a:effectLst/>
+              <a:latin typeface="+mn-lt"/>
+              <a:ea typeface="+mn-ea"/>
+              <a:cs typeface="+mn-cs"/>
+            </a:endParaRPr>
+          </a:p>
+          <a:p>
+            <a:r>
+              <a:rPr lang="en-US" sz="1200" kern="1200" dirty="0">
+                <a:solidFill>
+                  <a:schemeClr val="tx1"/>
+                </a:solidFill>
+                <a:effectLst/>
+                <a:latin typeface="+mn-lt"/>
+                <a:ea typeface="+mn-ea"/>
+                <a:cs typeface="+mn-cs"/>
+              </a:rPr>
+              <a:t>[click] [click] [click]</a:t>
+            </a:r>
+          </a:p>
+          <a:p>
+            <a:r>
+              <a:rPr lang="en-US" sz="1200" kern="1200" dirty="0">
+                <a:solidFill>
+                  <a:schemeClr val="tx1"/>
+                </a:solidFill>
+                <a:effectLst/>
+                <a:latin typeface="+mn-lt"/>
+                <a:ea typeface="+mn-ea"/>
+                <a:cs typeface="+mn-cs"/>
+              </a:rPr>
+              <a:t>To see the employment rate, we also collected population data. Unexpectedly, it took time for us to fine population for these years. [click middle box, right box]</a:t>
+            </a:r>
+          </a:p>
+          <a:p>
+            <a:r>
+              <a:rPr lang="en-US" sz="1200" kern="1200" dirty="0">
+                <a:solidFill>
+                  <a:schemeClr val="tx1"/>
+                </a:solidFill>
+                <a:effectLst/>
+                <a:latin typeface="+mn-lt"/>
+                <a:ea typeface="+mn-ea"/>
+                <a:cs typeface="+mn-cs"/>
+              </a:rPr>
+              <a:t>Since the sources are different, we had to match the county names and the data format for the numbers. [click leftmost box].</a:t>
+            </a:r>
+          </a:p>
+          <a:p>
+            <a:endParaRPr lang="en-US" sz="1200" kern="1200" dirty="0">
+              <a:solidFill>
+                <a:schemeClr val="tx1"/>
+              </a:solidFill>
+              <a:effectLst/>
+              <a:latin typeface="+mn-lt"/>
+              <a:ea typeface="+mn-ea"/>
+              <a:cs typeface="+mn-cs"/>
+            </a:endParaRPr>
+          </a:p>
+          <a:p>
+            <a:r>
+              <a:rPr lang="en-US" sz="1200" kern="1200" dirty="0">
+                <a:solidFill>
+                  <a:schemeClr val="tx1"/>
+                </a:solidFill>
+                <a:effectLst/>
+                <a:latin typeface="+mn-lt"/>
+                <a:ea typeface="+mn-ea"/>
+                <a:cs typeface="+mn-cs"/>
+              </a:rPr>
+              <a:t>[click]</a:t>
+            </a:r>
+          </a:p>
+          <a:p>
+            <a:r>
+              <a:rPr lang="en-US" sz="1200" kern="1200" dirty="0">
+                <a:solidFill>
+                  <a:schemeClr val="tx1"/>
+                </a:solidFill>
+                <a:effectLst/>
+                <a:latin typeface="+mn-lt"/>
+                <a:ea typeface="+mn-ea"/>
+                <a:cs typeface="+mn-cs"/>
+              </a:rPr>
+              <a:t>The county employee data was loaded into mongo </a:t>
+            </a:r>
+            <a:r>
+              <a:rPr lang="en-US" sz="1200" kern="1200" dirty="0" err="1">
+                <a:solidFill>
+                  <a:schemeClr val="tx1"/>
+                </a:solidFill>
+                <a:effectLst/>
+                <a:latin typeface="+mn-lt"/>
+                <a:ea typeface="+mn-ea"/>
+                <a:cs typeface="+mn-cs"/>
+              </a:rPr>
+              <a:t>db</a:t>
+            </a:r>
+            <a:r>
+              <a:rPr lang="en-US" sz="1200" kern="1200" dirty="0">
+                <a:solidFill>
+                  <a:schemeClr val="tx1"/>
+                </a:solidFill>
+                <a:effectLst/>
+                <a:latin typeface="+mn-lt"/>
+                <a:ea typeface="+mn-ea"/>
+                <a:cs typeface="+mn-cs"/>
+              </a:rPr>
+              <a:t>, census collection.</a:t>
+            </a:r>
+          </a:p>
+          <a:p>
+            <a:r>
+              <a:rPr lang="en-US" sz="1200" kern="1200" dirty="0">
+                <a:solidFill>
+                  <a:schemeClr val="tx1"/>
+                </a:solidFill>
+                <a:effectLst/>
+                <a:latin typeface="+mn-lt"/>
+                <a:ea typeface="+mn-ea"/>
+                <a:cs typeface="+mn-cs"/>
+              </a:rPr>
+              <a:t>[click]</a:t>
+            </a:r>
+          </a:p>
+          <a:p>
+            <a:r>
+              <a:rPr lang="en-US" sz="1200" kern="1200" dirty="0">
+                <a:solidFill>
+                  <a:schemeClr val="tx1"/>
+                </a:solidFill>
+                <a:effectLst/>
+                <a:latin typeface="+mn-lt"/>
+                <a:ea typeface="+mn-ea"/>
+                <a:cs typeface="+mn-cs"/>
+              </a:rPr>
+              <a:t>State-wide data was loaded into </a:t>
+            </a:r>
+            <a:r>
+              <a:rPr lang="en-US" sz="1200" kern="1200" dirty="0" err="1">
+                <a:solidFill>
+                  <a:schemeClr val="tx1"/>
+                </a:solidFill>
+                <a:effectLst/>
+                <a:latin typeface="+mn-lt"/>
+                <a:ea typeface="+mn-ea"/>
+                <a:cs typeface="+mn-cs"/>
+              </a:rPr>
+              <a:t>nccensus</a:t>
+            </a:r>
+            <a:r>
+              <a:rPr lang="en-US" sz="1200" kern="1200" dirty="0">
+                <a:solidFill>
+                  <a:schemeClr val="tx1"/>
+                </a:solidFill>
+                <a:effectLst/>
+                <a:latin typeface="+mn-lt"/>
+                <a:ea typeface="+mn-ea"/>
+                <a:cs typeface="+mn-cs"/>
+              </a:rPr>
+              <a:t> collection.</a:t>
+            </a:r>
+          </a:p>
+          <a:p>
+            <a:r>
+              <a:rPr lang="en-US" sz="1200" kern="1200" dirty="0">
+                <a:solidFill>
+                  <a:schemeClr val="tx1"/>
+                </a:solidFill>
+                <a:effectLst/>
+                <a:latin typeface="+mn-lt"/>
+                <a:ea typeface="+mn-ea"/>
+                <a:cs typeface="+mn-cs"/>
+              </a:rPr>
+              <a:t>[click] The combined population table was stored in csv file. (Each year 100 rows)</a:t>
+            </a:r>
+          </a:p>
+          <a:p>
+            <a:endParaRPr lang="en-US" sz="1200" kern="1200" dirty="0">
+              <a:solidFill>
+                <a:schemeClr val="tx1"/>
+              </a:solidFill>
+              <a:effectLst/>
+              <a:latin typeface="+mn-lt"/>
+              <a:ea typeface="+mn-ea"/>
+              <a:cs typeface="+mn-cs"/>
+            </a:endParaRPr>
+          </a:p>
+          <a:p>
+            <a:r>
+              <a:rPr lang="en-US" sz="1200" kern="1200" dirty="0">
+                <a:solidFill>
+                  <a:schemeClr val="tx1"/>
+                </a:solidFill>
+                <a:effectLst/>
+                <a:latin typeface="+mn-lt"/>
+                <a:ea typeface="+mn-ea"/>
+                <a:cs typeface="+mn-cs"/>
+              </a:rPr>
+              <a:t>The map </a:t>
+            </a:r>
+            <a:r>
+              <a:rPr lang="en-US" sz="1200" kern="1200" dirty="0" err="1">
+                <a:solidFill>
+                  <a:schemeClr val="tx1"/>
+                </a:solidFill>
+                <a:effectLst/>
+                <a:latin typeface="+mn-lt"/>
+                <a:ea typeface="+mn-ea"/>
+                <a:cs typeface="+mn-cs"/>
+              </a:rPr>
+              <a:t>geojson</a:t>
+            </a:r>
+            <a:r>
+              <a:rPr lang="en-US" sz="1200" kern="1200" dirty="0">
+                <a:solidFill>
+                  <a:schemeClr val="tx1"/>
+                </a:solidFill>
+                <a:effectLst/>
+                <a:latin typeface="+mn-lt"/>
+                <a:ea typeface="+mn-ea"/>
+                <a:cs typeface="+mn-cs"/>
+              </a:rPr>
+              <a:t> has county number which is different from census data. We made combined table and stored in json file.</a:t>
+            </a:r>
+          </a:p>
+          <a:p>
+            <a:endParaRPr lang="en-US" sz="1200" kern="1200" dirty="0">
+              <a:solidFill>
+                <a:schemeClr val="tx1"/>
+              </a:solidFill>
+              <a:effectLst/>
+              <a:latin typeface="+mn-lt"/>
+              <a:ea typeface="+mn-ea"/>
+              <a:cs typeface="+mn-cs"/>
+            </a:endParaRPr>
+          </a:p>
+          <a:p>
+            <a:r>
+              <a:rPr lang="en-US" sz="1200" kern="1200" dirty="0" err="1">
+                <a:solidFill>
+                  <a:schemeClr val="tx1"/>
+                </a:solidFill>
+                <a:effectLst/>
+                <a:latin typeface="+mn-lt"/>
+                <a:ea typeface="+mn-ea"/>
+                <a:cs typeface="+mn-cs"/>
+              </a:rPr>
+              <a:t>Teshanee</a:t>
+            </a:r>
+            <a:r>
+              <a:rPr lang="en-US" sz="1200" kern="1200" dirty="0">
+                <a:solidFill>
+                  <a:schemeClr val="tx1"/>
+                </a:solidFill>
+                <a:effectLst/>
+                <a:latin typeface="+mn-lt"/>
+                <a:ea typeface="+mn-ea"/>
+                <a:cs typeface="+mn-cs"/>
+              </a:rPr>
+              <a:t> will summarize our presentation after giving you interesting observations.</a:t>
+            </a:r>
+          </a:p>
+          <a:p>
             <a:endParaRPr lang="en-US" dirty="0"/>
           </a:p>
         </p:txBody>
@@ -935,7 +1551,7 @@
           <a:p>
             <a:fld id="{EA0C0817-A112-4847-8014-A94B7D2A4EA3}" type="datetime1">
               <a:rPr lang="en-US" smtClean="0"/>
-              <a:t>10/8/2020</a:t>
+              <a:t>10/8/20</a:t>
             </a:fld>
             <a:endParaRPr lang="en-US" dirty="0"/>
           </a:p>
@@ -1105,7 +1721,7 @@
           <a:p>
             <a:fld id="{F6FA2B21-3FCD-4721-B95C-427943F61125}" type="datetime1">
               <a:rPr lang="en-US" smtClean="0"/>
-              <a:t>10/8/2020</a:t>
+              <a:t>10/8/20</a:t>
             </a:fld>
             <a:endParaRPr lang="en-US" dirty="0"/>
           </a:p>
@@ -1286,7 +1902,7 @@
           <a:p>
             <a:fld id="{F6FA2B21-3FCD-4721-B95C-427943F61125}" type="datetime1">
               <a:rPr lang="en-US" smtClean="0"/>
-              <a:t>10/8/2020</a:t>
+              <a:t>10/8/20</a:t>
             </a:fld>
             <a:endParaRPr lang="en-US" dirty="0"/>
           </a:p>
@@ -1457,7 +2073,7 @@
           <a:p>
             <a:fld id="{7332B432-ACDA-4023-A761-2BAB76577B62}" type="datetime1">
               <a:rPr lang="en-US" smtClean="0"/>
-              <a:t>10/8/2020</a:t>
+              <a:t>10/8/20</a:t>
             </a:fld>
             <a:endParaRPr lang="en-US" dirty="0"/>
           </a:p>
@@ -1725,7 +2341,7 @@
           <a:p>
             <a:fld id="{D9C646AA-F36E-4540-911D-FFFC0A0EF24A}" type="datetime1">
               <a:rPr lang="en-US" smtClean="0"/>
-              <a:t>10/8/2020</a:t>
+              <a:t>10/8/20</a:t>
             </a:fld>
             <a:endParaRPr lang="en-US" dirty="0"/>
           </a:p>
@@ -1957,7 +2573,7 @@
           <a:p>
             <a:fld id="{69186D26-FA5F-4637-B602-B7C2DC34CFD4}" type="datetime1">
               <a:rPr lang="en-US" smtClean="0"/>
-              <a:t>10/8/2020</a:t>
+              <a:t>10/8/20</a:t>
             </a:fld>
             <a:endParaRPr lang="en-US" dirty="0"/>
           </a:p>
@@ -2316,7 +2932,7 @@
           <a:p>
             <a:fld id="{F6FA2B21-3FCD-4721-B95C-427943F61125}" type="datetime1">
               <a:rPr lang="en-US" smtClean="0"/>
-              <a:t>10/8/2020</a:t>
+              <a:t>10/8/20</a:t>
             </a:fld>
             <a:endParaRPr lang="en-US" dirty="0"/>
           </a:p>
@@ -2458,7 +3074,7 @@
           <a:p>
             <a:fld id="{F9A96C99-B8F8-4528-BD05-0E16E943DC09}" type="datetime1">
               <a:rPr lang="en-US" smtClean="0"/>
-              <a:t>10/8/2020</a:t>
+              <a:t>10/8/20</a:t>
             </a:fld>
             <a:endParaRPr lang="en-US" dirty="0"/>
           </a:p>
@@ -2553,7 +3169,7 @@
           <a:p>
             <a:fld id="{03636942-C211-4B28-8DBD-C953E00AF71B}" type="datetime1">
               <a:rPr lang="en-US" smtClean="0"/>
-              <a:t>10/8/2020</a:t>
+              <a:t>10/8/20</a:t>
             </a:fld>
             <a:endParaRPr lang="en-US" dirty="0"/>
           </a:p>
@@ -2910,7 +3526,7 @@
           <a:p>
             <a:fld id="{7E8D12A6-918A-48BD-8CB9-CA713993B0EA}" type="datetime1">
               <a:rPr lang="en-US" smtClean="0"/>
-              <a:t>10/8/2020</a:t>
+              <a:t>10/8/20</a:t>
             </a:fld>
             <a:endParaRPr lang="en-US" dirty="0"/>
           </a:p>
@@ -3268,7 +3884,7 @@
             <a:fld id="{E778CE86-875F-4587-BCF6-FA054AFC0D53}" type="datetime1">
               <a:rPr lang="en-US" smtClean="0"/>
               <a:pPr/>
-              <a:t>10/8/2020</a:t>
+              <a:t>10/8/20</a:t>
             </a:fld>
             <a:endParaRPr lang="en-US" dirty="0"/>
           </a:p>
@@ -3511,7 +4127,7 @@
           <a:p>
             <a:fld id="{F6FA2B21-3FCD-4721-B95C-427943F61125}" type="datetime1">
               <a:rPr lang="en-US" smtClean="0"/>
-              <a:t>10/8/2020</a:t>
+              <a:t>10/8/20</a:t>
             </a:fld>
             <a:endParaRPr lang="en-US" dirty="0"/>
           </a:p>
@@ -4130,6 +4746,66 @@
 </p:sld>
 </file>
 
+<file path=ppt/slides/slide10.xml><?xml version="1.0" encoding="utf-8"?>
+<p:sld xmlns:a="http://schemas.openxmlformats.org/drawingml/2006/main" xmlns:r="http://schemas.openxmlformats.org/officeDocument/2006/relationships" xmlns:p="http://schemas.openxmlformats.org/presentationml/2006/main">
+  <p:cSld>
+    <p:spTree>
+      <p:nvGrpSpPr>
+        <p:cNvPr id="1" name=""/>
+        <p:cNvGrpSpPr/>
+        <p:nvPr/>
+      </p:nvGrpSpPr>
+      <p:grpSpPr>
+        <a:xfrm>
+          <a:off x="0" y="0"/>
+          <a:ext cx="0" cy="0"/>
+          <a:chOff x="0" y="0"/>
+          <a:chExt cx="0" cy="0"/>
+        </a:xfrm>
+      </p:grpSpPr>
+      <p:pic>
+        <p:nvPicPr>
+          <p:cNvPr id="6" name="Picture 5">
+            <a:extLst>
+              <a:ext uri="{FF2B5EF4-FFF2-40B4-BE49-F238E27FC236}">
+                <a16:creationId xmlns:a16="http://schemas.microsoft.com/office/drawing/2014/main" id="{2F4C045F-D7DD-4748-9999-D7DD7602B3E2}"/>
+              </a:ext>
+            </a:extLst>
+          </p:cNvPr>
+          <p:cNvPicPr>
+            <a:picLocks noChangeAspect="1"/>
+          </p:cNvPicPr>
+          <p:nvPr/>
+        </p:nvPicPr>
+        <p:blipFill>
+          <a:blip r:embed="rId2"/>
+          <a:stretch>
+            <a:fillRect/>
+          </a:stretch>
+        </p:blipFill>
+        <p:spPr>
+          <a:xfrm>
+            <a:off x="2625772" y="0"/>
+            <a:ext cx="5563432" cy="6858000"/>
+          </a:xfrm>
+          <a:prstGeom prst="rect">
+            <a:avLst/>
+          </a:prstGeom>
+        </p:spPr>
+      </p:pic>
+    </p:spTree>
+    <p:extLst>
+      <p:ext uri="{BB962C8B-B14F-4D97-AF65-F5344CB8AC3E}">
+        <p14:creationId xmlns:p14="http://schemas.microsoft.com/office/powerpoint/2010/main" val="436933775"/>
+      </p:ext>
+    </p:extLst>
+  </p:cSld>
+  <p:clrMapOvr>
+    <a:masterClrMapping/>
+  </p:clrMapOvr>
+</p:sld>
+</file>
+
 <file path=ppt/slides/slide2.xml><?xml version="1.0" encoding="utf-8"?>
 <p:sld xmlns:a="http://schemas.openxmlformats.org/drawingml/2006/main" xmlns:r="http://schemas.openxmlformats.org/officeDocument/2006/relationships" xmlns:p="http://schemas.openxmlformats.org/presentationml/2006/main">
   <p:cSld>
@@ -4649,7 +5325,7 @@
             <p:ph idx="1"/>
             <p:extLst>
               <p:ext uri="{D42A27DB-BD31-4B8C-83A1-F6EECF244321}">
-                <p14:modId xmlns:p14="http://schemas.microsoft.com/office/powerpoint/2010/main" val="3893356998"/>
+                <p14:modId xmlns:p14="http://schemas.microsoft.com/office/powerpoint/2010/main" val="3162412792"/>
               </p:ext>
             </p:extLst>
           </p:nvPr>
@@ -5541,7 +6217,14 @@
                     <a:lstStyle/>
                     <a:p>
                       <a:r>
-                        <a:rPr lang="en-US" sz="1200" b="0" dirty="0"/>
+                        <a:rPr lang="en-US" sz="1200" b="0" dirty="0">
+                          <a:solidFill>
+                            <a:schemeClr val="tx2">
+                              <a:lumMod val="40000"/>
+                              <a:lumOff val="60000"/>
+                            </a:schemeClr>
+                          </a:solidFill>
+                        </a:rPr>
                         <a:t>2012</a:t>
                       </a:r>
                     </a:p>
@@ -5583,6 +6266,11 @@
                       <a:headEnd type="none" w="med" len="med"/>
                       <a:tailEnd type="none" w="med" len="med"/>
                     </a:lnB>
+                    <a:solidFill>
+                      <a:schemeClr val="tx2">
+                        <a:lumMod val="75000"/>
+                      </a:schemeClr>
+                    </a:solidFill>
                   </a:tcPr>
                 </a:tc>
                 <a:tc>
@@ -5591,7 +6279,14 @@
                     <a:lstStyle/>
                     <a:p>
                       <a:r>
-                        <a:rPr lang="en-US" sz="1200" b="0" dirty="0"/>
+                        <a:rPr lang="en-US" sz="1200" b="0" dirty="0">
+                          <a:solidFill>
+                            <a:schemeClr val="tx2">
+                              <a:lumMod val="40000"/>
+                              <a:lumOff val="60000"/>
+                            </a:schemeClr>
+                          </a:solidFill>
+                        </a:rPr>
                         <a:t>2013</a:t>
                       </a:r>
                     </a:p>
@@ -5633,6 +6328,11 @@
                       <a:headEnd type="none" w="med" len="med"/>
                       <a:tailEnd type="none" w="med" len="med"/>
                     </a:lnB>
+                    <a:solidFill>
+                      <a:schemeClr val="tx2">
+                        <a:lumMod val="75000"/>
+                      </a:schemeClr>
+                    </a:solidFill>
                   </a:tcPr>
                 </a:tc>
                 <a:tc>
@@ -6548,6 +7248,11 @@
                       <a:headEnd type="none" w="med" len="med"/>
                       <a:tailEnd type="none" w="med" len="med"/>
                     </a:lnB>
+                    <a:solidFill>
+                      <a:schemeClr val="tx2">
+                        <a:lumMod val="75000"/>
+                      </a:schemeClr>
+                    </a:solidFill>
                   </a:tcPr>
                 </a:tc>
                 <a:tc>
@@ -6555,7 +7260,7 @@
                     <a:bodyPr/>
                     <a:lstStyle/>
                     <a:p>
-                      <a:endParaRPr lang="en-US" sz="1200" b="0"/>
+                      <a:endParaRPr lang="en-US" sz="1200" b="0" dirty="0"/>
                     </a:p>
                   </a:txBody>
                   <a:tcPr>
@@ -6595,6 +7300,11 @@
                       <a:headEnd type="none" w="med" len="med"/>
                       <a:tailEnd type="none" w="med" len="med"/>
                     </a:lnB>
+                    <a:solidFill>
+                      <a:schemeClr val="tx2">
+                        <a:lumMod val="75000"/>
+                      </a:schemeClr>
+                    </a:solidFill>
                   </a:tcPr>
                 </a:tc>
                 <a:tc>
@@ -6865,7 +7575,6 @@
         <p:sp>
           <p:nvSpPr>
             <p:cNvPr id="7" name="TextBox 6">
-              <a:hlinkClick r:id="rId3" action="ppaction://hlinkfile"/>
               <a:extLst>
                 <a:ext uri="{FF2B5EF4-FFF2-40B4-BE49-F238E27FC236}">
                   <a16:creationId xmlns:a16="http://schemas.microsoft.com/office/drawing/2014/main" id="{EC826077-081D-C844-B890-A0696C400C62}"/>
@@ -7150,10 +7859,10 @@
       </p:grpSp>
       <p:grpSp>
         <p:nvGrpSpPr>
-          <p:cNvPr id="68" name="Group 67">
+          <p:cNvPr id="8" name="Group 7">
             <a:extLst>
               <a:ext uri="{FF2B5EF4-FFF2-40B4-BE49-F238E27FC236}">
-                <a16:creationId xmlns:a16="http://schemas.microsoft.com/office/drawing/2014/main" id="{1FBA0FC6-4449-A848-9502-E6F26193B7C1}"/>
+                <a16:creationId xmlns:a16="http://schemas.microsoft.com/office/drawing/2014/main" id="{0BB10437-B6CB-6743-AD91-66BDD21D95E7}"/>
               </a:ext>
             </a:extLst>
           </p:cNvPr>
@@ -7162,16 +7871,16 @@
         </p:nvGrpSpPr>
         <p:grpSpPr>
           <a:xfrm>
-            <a:off x="7629617" y="2217684"/>
-            <a:ext cx="3525746" cy="1538883"/>
-            <a:chOff x="7629617" y="2217684"/>
-            <a:chExt cx="3525746" cy="1538883"/>
+            <a:off x="8612114" y="2217684"/>
+            <a:ext cx="2543247" cy="1555239"/>
+            <a:chOff x="8612114" y="2217684"/>
+            <a:chExt cx="2543247" cy="1555239"/>
           </a:xfrm>
         </p:grpSpPr>
         <p:sp>
           <p:nvSpPr>
             <p:cNvPr id="6" name="TextBox 5">
-              <a:hlinkClick r:id="rId4" action="ppaction://hlinkfile"/>
+              <a:hlinkClick r:id="rId3" action="ppaction://hlinksldjump"/>
               <a:extLst>
                 <a:ext uri="{FF2B5EF4-FFF2-40B4-BE49-F238E27FC236}">
                   <a16:creationId xmlns:a16="http://schemas.microsoft.com/office/drawing/2014/main" id="{5760FBAA-131D-4443-B1A0-BAD67826A759}"/>
@@ -7183,8 +7892,8 @@
           </p:nvSpPr>
           <p:spPr>
             <a:xfrm>
-              <a:off x="7629617" y="2234040"/>
-              <a:ext cx="2506894" cy="1323439"/>
+              <a:off x="8612114" y="2234040"/>
+              <a:ext cx="1538752" cy="1538883"/>
             </a:xfrm>
             <a:prstGeom prst="rect">
               <a:avLst/>
@@ -7219,7 +7928,7 @@
             <a:p>
               <a:r>
                 <a:rPr lang="en-US" sz="1400" dirty="0"/>
-                <a:t>Business Sectors EMP</a:t>
+                <a:t>Business Sectors</a:t>
               </a:r>
             </a:p>
             <a:p>
@@ -7242,7 +7951,6 @@
         <p:sp>
           <p:nvSpPr>
             <p:cNvPr id="13" name="TextBox 12">
-              <a:hlinkClick r:id="rId5" action="ppaction://hlinkfile"/>
               <a:extLst>
                 <a:ext uri="{FF2B5EF4-FFF2-40B4-BE49-F238E27FC236}">
                   <a16:creationId xmlns:a16="http://schemas.microsoft.com/office/drawing/2014/main" id="{82BA92C3-D2DC-4D41-881E-FBC486E9D5C0}"/>
@@ -7254,8 +7962,8 @@
           </p:nvSpPr>
           <p:spPr>
             <a:xfrm>
-              <a:off x="10150867" y="2217684"/>
-              <a:ext cx="1004496" cy="1538883"/>
+              <a:off x="10134029" y="2217684"/>
+              <a:ext cx="1021332" cy="1323439"/>
             </a:xfrm>
             <a:prstGeom prst="rect">
               <a:avLst/>
@@ -7288,7 +7996,7 @@
               </a:r>
               <a:r>
                 <a:rPr lang="en-US" sz="1400" dirty="0"/>
-                <a:t>Business Sectors EMP</a:t>
+                <a:t>Business Sectors</a:t>
               </a:r>
             </a:p>
             <a:p>
@@ -7312,7 +8020,6 @@
       <p:sp>
         <p:nvSpPr>
           <p:cNvPr id="9" name="TextBox 8">
-            <a:hlinkClick r:id="rId6" action="ppaction://hlinkfile"/>
             <a:extLst>
               <a:ext uri="{FF2B5EF4-FFF2-40B4-BE49-F238E27FC236}">
                 <a16:creationId xmlns:a16="http://schemas.microsoft.com/office/drawing/2014/main" id="{9724BF09-033F-A94A-8965-B6788B85E067}"/>
@@ -7372,7 +8079,6 @@
       <p:sp>
         <p:nvSpPr>
           <p:cNvPr id="14" name="TextBox 13">
-            <a:hlinkClick r:id="rId7" action="ppaction://hlinkfile"/>
             <a:extLst>
               <a:ext uri="{FF2B5EF4-FFF2-40B4-BE49-F238E27FC236}">
                 <a16:creationId xmlns:a16="http://schemas.microsoft.com/office/drawing/2014/main" id="{BF149DC7-6DF9-F846-821A-B038EF749B6D}"/>
@@ -7437,7 +8143,6 @@
       <p:sp>
         <p:nvSpPr>
           <p:cNvPr id="15" name="TextBox 14">
-            <a:hlinkClick r:id="rId8" action="ppaction://hlinkfile"/>
             <a:extLst>
               <a:ext uri="{FF2B5EF4-FFF2-40B4-BE49-F238E27FC236}">
                 <a16:creationId xmlns:a16="http://schemas.microsoft.com/office/drawing/2014/main" id="{21B13838-80F3-634C-987F-4474F48895DE}"/>
@@ -7773,10 +8478,10 @@
         </p:nvGrpSpPr>
         <p:grpSpPr>
           <a:xfrm>
-            <a:off x="7643973" y="4008474"/>
-            <a:ext cx="3525746" cy="1169551"/>
-            <a:chOff x="7643973" y="4008474"/>
-            <a:chExt cx="3525746" cy="1169551"/>
+            <a:off x="8612113" y="4008474"/>
+            <a:ext cx="2557606" cy="1169551"/>
+            <a:chOff x="8612113" y="4008474"/>
+            <a:chExt cx="2557606" cy="1169551"/>
           </a:xfrm>
         </p:grpSpPr>
         <p:sp>
@@ -7793,8 +8498,8 @@
           </p:nvSpPr>
           <p:spPr>
             <a:xfrm>
-              <a:off x="7643973" y="4024830"/>
-              <a:ext cx="2506894" cy="738664"/>
+              <a:off x="8612113" y="4024830"/>
+              <a:ext cx="1538753" cy="954107"/>
             </a:xfrm>
             <a:prstGeom prst="rect">
               <a:avLst/>
@@ -8370,7 +9075,7 @@
             <p:nvPr/>
           </p:nvPicPr>
           <p:blipFill>
-            <a:blip r:embed="rId9"/>
+            <a:blip r:embed="rId4"/>
             <a:stretch>
               <a:fillRect/>
             </a:stretch>
@@ -8386,6 +9091,66 @@
           </p:spPr>
         </p:pic>
       </p:grpSp>
+      <p:pic>
+        <p:nvPicPr>
+          <p:cNvPr id="5" name="Picture 4" descr="Graphical user interface, text&#10;&#10;Description automatically generated">
+            <a:extLst>
+              <a:ext uri="{FF2B5EF4-FFF2-40B4-BE49-F238E27FC236}">
+                <a16:creationId xmlns:a16="http://schemas.microsoft.com/office/drawing/2014/main" id="{E2A6FD7A-68B0-5A49-BA85-2F90CA427155}"/>
+              </a:ext>
+            </a:extLst>
+          </p:cNvPr>
+          <p:cNvPicPr>
+            <a:picLocks noChangeAspect="1"/>
+          </p:cNvPicPr>
+          <p:nvPr/>
+        </p:nvPicPr>
+        <p:blipFill>
+          <a:blip r:embed="rId5"/>
+          <a:stretch>
+            <a:fillRect/>
+          </a:stretch>
+        </p:blipFill>
+        <p:spPr>
+          <a:xfrm>
+            <a:off x="6827550" y="626064"/>
+            <a:ext cx="4475030" cy="1088315"/>
+          </a:xfrm>
+          <a:prstGeom prst="rect">
+            <a:avLst/>
+          </a:prstGeom>
+        </p:spPr>
+      </p:pic>
+      <p:pic>
+        <p:nvPicPr>
+          <p:cNvPr id="17" name="Picture 16">
+            <a:extLst>
+              <a:ext uri="{FF2B5EF4-FFF2-40B4-BE49-F238E27FC236}">
+                <a16:creationId xmlns:a16="http://schemas.microsoft.com/office/drawing/2014/main" id="{16FBBC00-446F-E143-99E3-D7C58AE14DAE}"/>
+              </a:ext>
+            </a:extLst>
+          </p:cNvPr>
+          <p:cNvPicPr>
+            <a:picLocks noChangeAspect="1"/>
+          </p:cNvPicPr>
+          <p:nvPr/>
+        </p:nvPicPr>
+        <p:blipFill>
+          <a:blip r:embed="rId6"/>
+          <a:stretch>
+            <a:fillRect/>
+          </a:stretch>
+        </p:blipFill>
+        <p:spPr>
+          <a:xfrm>
+            <a:off x="5850555" y="553354"/>
+            <a:ext cx="5600700" cy="4838700"/>
+          </a:xfrm>
+          <a:prstGeom prst="rect">
+            <a:avLst/>
+          </a:prstGeom>
+        </p:spPr>
+      </p:pic>
     </p:spTree>
     <p:extLst>
       <p:ext uri="{BB962C8B-B14F-4D97-AF65-F5344CB8AC3E}">
@@ -8430,7 +9195,7 @@
                                           </p:stCondLst>
                                         </p:cTn>
                                         <p:tgtEl>
-                                          <p:spTgt spid="4"/>
+                                          <p:spTgt spid="5"/>
                                         </p:tgtEl>
                                         <p:attrNameLst>
                                           <p:attrName>style.visibility</p:attrName>
@@ -8441,6 +9206,22 @@
                                       </p:to>
                                     </p:set>
                                   </p:childTnLst>
+                                  <p:subTnLst>
+                                    <p:set>
+                                      <p:cBhvr override="childStyle">
+                                        <p:cTn dur="1" fill="hold" display="0" masterRel="nextClick" afterEffect="1"/>
+                                        <p:tgtEl>
+                                          <p:spTgt spid="5"/>
+                                        </p:tgtEl>
+                                        <p:attrNameLst>
+                                          <p:attrName>style.visibility</p:attrName>
+                                        </p:attrNameLst>
+                                      </p:cBhvr>
+                                      <p:to>
+                                        <p:strVal val="hidden"/>
+                                      </p:to>
+                                    </p:set>
+                                  </p:subTnLst>
                                 </p:cTn>
                               </p:par>
                             </p:childTnLst>
@@ -8475,7 +9256,7 @@
                                           </p:stCondLst>
                                         </p:cTn>
                                         <p:tgtEl>
-                                          <p:spTgt spid="68"/>
+                                          <p:spTgt spid="8"/>
                                         </p:tgtEl>
                                         <p:attrNameLst>
                                           <p:attrName>style.visibility</p:attrName>
@@ -8520,7 +9301,7 @@
                                           </p:stCondLst>
                                         </p:cTn>
                                         <p:tgtEl>
-                                          <p:spTgt spid="70"/>
+                                          <p:spTgt spid="17"/>
                                         </p:tgtEl>
                                         <p:attrNameLst>
                                           <p:attrName>style.visibility</p:attrName>
@@ -8531,6 +9312,22 @@
                                       </p:to>
                                     </p:set>
                                   </p:childTnLst>
+                                  <p:subTnLst>
+                                    <p:set>
+                                      <p:cBhvr override="childStyle">
+                                        <p:cTn dur="1" fill="hold" display="0" masterRel="nextClick" afterEffect="1"/>
+                                        <p:tgtEl>
+                                          <p:spTgt spid="17"/>
+                                        </p:tgtEl>
+                                        <p:attrNameLst>
+                                          <p:attrName>style.visibility</p:attrName>
+                                        </p:attrNameLst>
+                                      </p:cBhvr>
+                                      <p:to>
+                                        <p:strVal val="hidden"/>
+                                      </p:to>
+                                    </p:set>
+                                  </p:subTnLst>
                                 </p:cTn>
                               </p:par>
                             </p:childTnLst>
@@ -8565,7 +9362,7 @@
                                           </p:stCondLst>
                                         </p:cTn>
                                         <p:tgtEl>
-                                          <p:spTgt spid="69"/>
+                                          <p:spTgt spid="70"/>
                                         </p:tgtEl>
                                         <p:attrNameLst>
                                           <p:attrName>style.visibility</p:attrName>
@@ -8610,7 +9407,7 @@
                                           </p:stCondLst>
                                         </p:cTn>
                                         <p:tgtEl>
-                                          <p:spTgt spid="71"/>
+                                          <p:spTgt spid="69"/>
                                         </p:tgtEl>
                                         <p:attrNameLst>
                                           <p:attrName>style.visibility</p:attrName>
@@ -8642,7 +9439,7 @@
                             </p:stCondLst>
                             <p:childTnLst>
                               <p:par>
-                                <p:cTn id="25" presetID="1" presetClass="entr" presetSubtype="0" fill="hold" grpId="0" nodeType="clickEffect">
+                                <p:cTn id="25" presetID="1" presetClass="entr" presetSubtype="0" fill="hold" nodeType="clickEffect">
                                   <p:stCondLst>
                                     <p:cond delay="0"/>
                                   </p:stCondLst>
@@ -8655,7 +9452,7 @@
                                           </p:stCondLst>
                                         </p:cTn>
                                         <p:tgtEl>
-                                          <p:spTgt spid="9"/>
+                                          <p:spTgt spid="71"/>
                                         </p:tgtEl>
                                         <p:attrNameLst>
                                           <p:attrName>style.visibility</p:attrName>
@@ -8700,7 +9497,7 @@
                                           </p:stCondLst>
                                         </p:cTn>
                                         <p:tgtEl>
-                                          <p:spTgt spid="14"/>
+                                          <p:spTgt spid="9"/>
                                         </p:tgtEl>
                                         <p:attrNameLst>
                                           <p:attrName>style.visibility</p:attrName>
@@ -8745,7 +9542,7 @@
                                           </p:stCondLst>
                                         </p:cTn>
                                         <p:tgtEl>
-                                          <p:spTgt spid="15"/>
+                                          <p:spTgt spid="14"/>
                                         </p:tgtEl>
                                         <p:attrNameLst>
                                           <p:attrName>style.visibility</p:attrName>
@@ -8777,7 +9574,7 @@
                             </p:stCondLst>
                             <p:childTnLst>
                               <p:par>
-                                <p:cTn id="37" presetID="2" presetClass="entr" presetSubtype="2" fill="hold" nodeType="clickEffect">
+                                <p:cTn id="37" presetID="1" presetClass="entr" presetSubtype="0" fill="hold" grpId="0" nodeType="clickEffect">
                                   <p:stCondLst>
                                     <p:cond delay="0"/>
                                   </p:stCondLst>
@@ -8785,6 +9582,51 @@
                                     <p:set>
                                       <p:cBhvr>
                                         <p:cTn id="38" dur="1" fill="hold">
+                                          <p:stCondLst>
+                                            <p:cond delay="0"/>
+                                          </p:stCondLst>
+                                        </p:cTn>
+                                        <p:tgtEl>
+                                          <p:spTgt spid="15"/>
+                                        </p:tgtEl>
+                                        <p:attrNameLst>
+                                          <p:attrName>style.visibility</p:attrName>
+                                        </p:attrNameLst>
+                                      </p:cBhvr>
+                                      <p:to>
+                                        <p:strVal val="visible"/>
+                                      </p:to>
+                                    </p:set>
+                                  </p:childTnLst>
+                                </p:cTn>
+                              </p:par>
+                            </p:childTnLst>
+                          </p:cTn>
+                        </p:par>
+                      </p:childTnLst>
+                    </p:cTn>
+                  </p:par>
+                  <p:par>
+                    <p:cTn id="39" fill="hold">
+                      <p:stCondLst>
+                        <p:cond delay="indefinite"/>
+                      </p:stCondLst>
+                      <p:childTnLst>
+                        <p:par>
+                          <p:cTn id="40" fill="hold">
+                            <p:stCondLst>
+                              <p:cond delay="0"/>
+                            </p:stCondLst>
+                            <p:childTnLst>
+                              <p:par>
+                                <p:cTn id="41" presetID="2" presetClass="entr" presetSubtype="2" fill="hold" nodeType="clickEffect">
+                                  <p:stCondLst>
+                                    <p:cond delay="0"/>
+                                  </p:stCondLst>
+                                  <p:childTnLst>
+                                    <p:set>
+                                      <p:cBhvr>
+                                        <p:cTn id="42" dur="1" fill="hold">
                                           <p:stCondLst>
                                             <p:cond delay="0"/>
                                           </p:stCondLst>
@@ -8802,7 +9644,7 @@
                                     </p:set>
                                     <p:anim calcmode="lin" valueType="num">
                                       <p:cBhvr additive="base">
-                                        <p:cTn id="39" dur="500" fill="hold"/>
+                                        <p:cTn id="43" dur="500" fill="hold"/>
                                         <p:tgtEl>
                                           <p:spTgt spid="73"/>
                                         </p:tgtEl>
@@ -8825,7 +9667,7 @@
                                     </p:anim>
                                     <p:anim calcmode="lin" valueType="num">
                                       <p:cBhvr additive="base">
-                                        <p:cTn id="40" dur="500" fill="hold"/>
+                                        <p:cTn id="44" dur="500" fill="hold"/>
                                         <p:tgtEl>
                                           <p:spTgt spid="73"/>
                                         </p:tgtEl>
@@ -8856,26 +9698,26 @@
                     </p:cTn>
                   </p:par>
                   <p:par>
-                    <p:cTn id="41" fill="hold">
+                    <p:cTn id="45" fill="hold">
                       <p:stCondLst>
                         <p:cond delay="indefinite"/>
                       </p:stCondLst>
                       <p:childTnLst>
                         <p:par>
-                          <p:cTn id="42" fill="hold">
+                          <p:cTn id="46" fill="hold">
                             <p:stCondLst>
                               <p:cond delay="0"/>
                             </p:stCondLst>
                             <p:childTnLst>
                               <p:par>
-                                <p:cTn id="43" presetID="2" presetClass="entr" presetSubtype="2" fill="hold" nodeType="clickEffect">
+                                <p:cTn id="47" presetID="2" presetClass="entr" presetSubtype="2" fill="hold" nodeType="clickEffect">
                                   <p:stCondLst>
                                     <p:cond delay="0"/>
                                   </p:stCondLst>
                                   <p:childTnLst>
                                     <p:set>
                                       <p:cBhvr>
-                                        <p:cTn id="44" dur="1" fill="hold">
+                                        <p:cTn id="48" dur="1" fill="hold">
                                           <p:stCondLst>
                                             <p:cond delay="0"/>
                                           </p:stCondLst>
@@ -8893,7 +9735,7 @@
                                     </p:set>
                                     <p:anim calcmode="lin" valueType="num">
                                       <p:cBhvr additive="base">
-                                        <p:cTn id="45" dur="500" fill="hold"/>
+                                        <p:cTn id="49" dur="500" fill="hold"/>
                                         <p:tgtEl>
                                           <p:spTgt spid="74"/>
                                         </p:tgtEl>
@@ -8916,7 +9758,7 @@
                                     </p:anim>
                                     <p:anim calcmode="lin" valueType="num">
                                       <p:cBhvr additive="base">
-                                        <p:cTn id="46" dur="500" fill="hold"/>
+                                        <p:cTn id="50" dur="500" fill="hold"/>
                                         <p:tgtEl>
                                           <p:spTgt spid="74"/>
                                         </p:tgtEl>
@@ -8947,26 +9789,26 @@
                     </p:cTn>
                   </p:par>
                   <p:par>
-                    <p:cTn id="47" fill="hold">
+                    <p:cTn id="51" fill="hold">
                       <p:stCondLst>
                         <p:cond delay="indefinite"/>
                       </p:stCondLst>
                       <p:childTnLst>
                         <p:par>
-                          <p:cTn id="48" fill="hold">
+                          <p:cTn id="52" fill="hold">
                             <p:stCondLst>
                               <p:cond delay="0"/>
                             </p:stCondLst>
                             <p:childTnLst>
                               <p:par>
-                                <p:cTn id="49" presetID="2" presetClass="entr" presetSubtype="2" fill="hold" nodeType="clickEffect">
+                                <p:cTn id="53" presetID="2" presetClass="entr" presetSubtype="2" fill="hold" nodeType="clickEffect">
                                   <p:stCondLst>
                                     <p:cond delay="0"/>
                                   </p:stCondLst>
                                   <p:childTnLst>
                                     <p:set>
                                       <p:cBhvr>
-                                        <p:cTn id="50" dur="1" fill="hold">
+                                        <p:cTn id="54" dur="1" fill="hold">
                                           <p:stCondLst>
                                             <p:cond delay="0"/>
                                           </p:stCondLst>
@@ -8984,7 +9826,7 @@
                                     </p:set>
                                     <p:anim calcmode="lin" valueType="num">
                                       <p:cBhvr additive="base">
-                                        <p:cTn id="51" dur="500" fill="hold"/>
+                                        <p:cTn id="55" dur="500" fill="hold"/>
                                         <p:tgtEl>
                                           <p:spTgt spid="75"/>
                                         </p:tgtEl>
@@ -9007,7 +9849,7 @@
                                     </p:anim>
                                     <p:anim calcmode="lin" valueType="num">
                                       <p:cBhvr additive="base">
-                                        <p:cTn id="52" dur="500" fill="hold"/>
+                                        <p:cTn id="56" dur="500" fill="hold"/>
                                         <p:tgtEl>
                                           <p:spTgt spid="75"/>
                                         </p:tgtEl>
@@ -9038,26 +9880,26 @@
                     </p:cTn>
                   </p:par>
                   <p:par>
-                    <p:cTn id="53" fill="hold">
+                    <p:cTn id="57" fill="hold">
                       <p:stCondLst>
                         <p:cond delay="indefinite"/>
                       </p:stCondLst>
                       <p:childTnLst>
                         <p:par>
-                          <p:cTn id="54" fill="hold">
+                          <p:cTn id="58" fill="hold">
                             <p:stCondLst>
                               <p:cond delay="0"/>
                             </p:stCondLst>
                             <p:childTnLst>
                               <p:par>
-                                <p:cTn id="55" presetID="53" presetClass="entr" presetSubtype="16" fill="hold" nodeType="clickEffect">
+                                <p:cTn id="59" presetID="53" presetClass="entr" presetSubtype="16" fill="hold" nodeType="clickEffect">
                                   <p:stCondLst>
                                     <p:cond delay="0"/>
                                   </p:stCondLst>
                                   <p:childTnLst>
                                     <p:set>
                                       <p:cBhvr>
-                                        <p:cTn id="56" dur="1" fill="hold">
+                                        <p:cTn id="60" dur="1" fill="hold">
                                           <p:stCondLst>
                                             <p:cond delay="0"/>
                                           </p:stCondLst>
@@ -9075,7 +9917,7 @@
                                     </p:set>
                                     <p:anim calcmode="lin" valueType="num">
                                       <p:cBhvr>
-                                        <p:cTn id="57" dur="500" fill="hold"/>
+                                        <p:cTn id="61" dur="500" fill="hold"/>
                                         <p:tgtEl>
                                           <p:spTgt spid="67"/>
                                         </p:tgtEl>
@@ -9098,7 +9940,7 @@
                                     </p:anim>
                                     <p:anim calcmode="lin" valueType="num">
                                       <p:cBhvr>
-                                        <p:cTn id="58" dur="500" fill="hold"/>
+                                        <p:cTn id="62" dur="500" fill="hold"/>
                                         <p:tgtEl>
                                           <p:spTgt spid="67"/>
                                         </p:tgtEl>
@@ -9121,7 +9963,7 @@
                                     </p:anim>
                                     <p:animEffect transition="in" filter="fade">
                                       <p:cBhvr>
-                                        <p:cTn id="59" dur="500"/>
+                                        <p:cTn id="63" dur="500"/>
                                         <p:tgtEl>
                                           <p:spTgt spid="67"/>
                                         </p:tgtEl>
@@ -9799,6 +10641,126 @@
     <p:extLst>
       <p:ext uri="{BB962C8B-B14F-4D97-AF65-F5344CB8AC3E}">
         <p14:creationId xmlns:p14="http://schemas.microsoft.com/office/powerpoint/2010/main" val="360152949"/>
+      </p:ext>
+    </p:extLst>
+  </p:cSld>
+  <p:clrMapOvr>
+    <a:masterClrMapping/>
+  </p:clrMapOvr>
+</p:sld>
+</file>
+
+<file path=ppt/slides/slide9.xml><?xml version="1.0" encoding="utf-8"?>
+<p:sld xmlns:a="http://schemas.openxmlformats.org/drawingml/2006/main" xmlns:r="http://schemas.openxmlformats.org/officeDocument/2006/relationships" xmlns:p="http://schemas.openxmlformats.org/presentationml/2006/main">
+  <p:cSld>
+    <p:spTree>
+      <p:nvGrpSpPr>
+        <p:cNvPr id="1" name=""/>
+        <p:cNvGrpSpPr/>
+        <p:nvPr/>
+      </p:nvGrpSpPr>
+      <p:grpSpPr>
+        <a:xfrm>
+          <a:off x="0" y="0"/>
+          <a:ext cx="0" cy="0"/>
+          <a:chOff x="0" y="0"/>
+          <a:chExt cx="0" cy="0"/>
+        </a:xfrm>
+      </p:grpSpPr>
+      <p:pic>
+        <p:nvPicPr>
+          <p:cNvPr id="6" name="Picture 5">
+            <a:extLst>
+              <a:ext uri="{FF2B5EF4-FFF2-40B4-BE49-F238E27FC236}">
+                <a16:creationId xmlns:a16="http://schemas.microsoft.com/office/drawing/2014/main" id="{0F750A24-604A-F742-8DF9-6ABBBBB74CE4}"/>
+              </a:ext>
+            </a:extLst>
+          </p:cNvPr>
+          <p:cNvPicPr>
+            <a:picLocks noChangeAspect="1"/>
+          </p:cNvPicPr>
+          <p:nvPr/>
+        </p:nvPicPr>
+        <p:blipFill>
+          <a:blip r:embed="rId2"/>
+          <a:stretch>
+            <a:fillRect/>
+          </a:stretch>
+        </p:blipFill>
+        <p:spPr>
+          <a:xfrm>
+            <a:off x="276294" y="0"/>
+            <a:ext cx="7392318" cy="5029200"/>
+          </a:xfrm>
+          <a:prstGeom prst="rect">
+            <a:avLst/>
+          </a:prstGeom>
+        </p:spPr>
+      </p:pic>
+      <p:pic>
+        <p:nvPicPr>
+          <p:cNvPr id="10" name="Picture 9">
+            <a:extLst>
+              <a:ext uri="{FF2B5EF4-FFF2-40B4-BE49-F238E27FC236}">
+                <a16:creationId xmlns:a16="http://schemas.microsoft.com/office/drawing/2014/main" id="{67884F93-347D-754A-B089-AA047CE60E90}"/>
+              </a:ext>
+            </a:extLst>
+          </p:cNvPr>
+          <p:cNvPicPr>
+            <a:picLocks noChangeAspect="1"/>
+          </p:cNvPicPr>
+          <p:nvPr/>
+        </p:nvPicPr>
+        <p:blipFill>
+          <a:blip r:embed="rId3"/>
+          <a:stretch>
+            <a:fillRect/>
+          </a:stretch>
+        </p:blipFill>
+        <p:spPr>
+          <a:xfrm>
+            <a:off x="5255848" y="1722574"/>
+            <a:ext cx="6936152" cy="3412852"/>
+          </a:xfrm>
+          <a:prstGeom prst="rect">
+            <a:avLst/>
+          </a:prstGeom>
+        </p:spPr>
+      </p:pic>
+      <p:pic>
+        <p:nvPicPr>
+          <p:cNvPr id="8" name="Picture 7">
+            <a:extLst>
+              <a:ext uri="{FF2B5EF4-FFF2-40B4-BE49-F238E27FC236}">
+                <a16:creationId xmlns:a16="http://schemas.microsoft.com/office/drawing/2014/main" id="{D1B7B1A2-ABC7-1747-9C4D-EF116DAD66E9}"/>
+              </a:ext>
+            </a:extLst>
+          </p:cNvPr>
+          <p:cNvPicPr>
+            <a:picLocks noChangeAspect="1"/>
+          </p:cNvPicPr>
+          <p:nvPr/>
+        </p:nvPicPr>
+        <p:blipFill>
+          <a:blip r:embed="rId4"/>
+          <a:stretch>
+            <a:fillRect/>
+          </a:stretch>
+        </p:blipFill>
+        <p:spPr>
+          <a:xfrm>
+            <a:off x="150021" y="4410147"/>
+            <a:ext cx="7872149" cy="2447853"/>
+          </a:xfrm>
+          <a:prstGeom prst="rect">
+            <a:avLst/>
+          </a:prstGeom>
+        </p:spPr>
+      </p:pic>
+    </p:spTree>
+    <p:extLst>
+      <p:ext uri="{BB962C8B-B14F-4D97-AF65-F5344CB8AC3E}">
+        <p14:creationId xmlns:p14="http://schemas.microsoft.com/office/powerpoint/2010/main" val="79239566"/>
       </p:ext>
     </p:extLst>
   </p:cSld>
@@ -10364,24 +11326,6 @@
 </file>
 
 <file path=customXml/item1.xml><?xml version="1.0" encoding="utf-8"?>
-<?mso-contentType ?>
-<FormTemplates xmlns="http://schemas.microsoft.com/sharepoint/v3/contenttype/forms">
-  <Display>DocumentLibraryForm</Display>
-  <Edit>DocumentLibraryForm</Edit>
-  <New>DocumentLibraryForm</New>
-</FormTemplates>
-</file>
-
-<file path=customXml/item2.xml><?xml version="1.0" encoding="utf-8"?>
-<p:properties xmlns:p="http://schemas.microsoft.com/office/2006/metadata/properties" xmlns:xsi="http://www.w3.org/2001/XMLSchema-instance" xmlns:pc="http://schemas.microsoft.com/office/infopath/2007/PartnerControls">
-  <documentManagement>
-    <Status xmlns="71af3243-3dd4-4a8d-8c0d-dd76da1f02a5">Not started</Status>
-    <MediaServiceKeyPoints xmlns="71af3243-3dd4-4a8d-8c0d-dd76da1f02a5" xsi:nil="true"/>
-  </documentManagement>
-</p:properties>
-</file>
-
-<file path=customXml/item3.xml><?xml version="1.0" encoding="utf-8"?>
 <ct:contentTypeSchema xmlns:ct="http://schemas.microsoft.com/office/2006/metadata/contentType" xmlns:ma="http://schemas.microsoft.com/office/2006/metadata/properties/metaAttributes" ct:_="" ma:_="" ma:contentTypeName="Document" ma:contentTypeID="0x01010079F111ED35F8CC479449609E8A0923A6" ma:contentTypeVersion="12" ma:contentTypeDescription="Create a new document." ma:contentTypeScope="" ma:versionID="a410dd7f93c95333ffa1b60ed6adedd1">
   <xsd:schema xmlns:xsd="http://www.w3.org/2001/XMLSchema" xmlns:xs="http://www.w3.org/2001/XMLSchema" xmlns:p="http://schemas.microsoft.com/office/2006/metadata/properties" xmlns:ns2="71af3243-3dd4-4a8d-8c0d-dd76da1f02a5" xmlns:ns3="16c05727-aa75-4e4a-9b5f-8a80a1165891" targetNamespace="http://schemas.microsoft.com/office/2006/metadata/properties" ma:root="true" ma:fieldsID="a936d9baba76aa3866493feff160faab" ns2:_="" ns3:_="">
     <xsd:import namespace="71af3243-3dd4-4a8d-8c0d-dd76da1f02a5"/>
@@ -10602,25 +11546,25 @@
 </ct:contentTypeSchema>
 </file>
 
-<file path=customXml/itemProps1.xml><?xml version="1.0" encoding="utf-8"?>
-<ds:datastoreItem xmlns:ds="http://schemas.openxmlformats.org/officeDocument/2006/customXml" ds:itemID="{7745B92C-4D89-4324-B52D-E1F5F627B790}">
-  <ds:schemaRefs>
-    <ds:schemaRef ds:uri="http://schemas.microsoft.com/sharepoint/v3/contenttype/forms"/>
-  </ds:schemaRefs>
-</ds:datastoreItem>
+<file path=customXml/item2.xml><?xml version="1.0" encoding="utf-8"?>
+<p:properties xmlns:p="http://schemas.microsoft.com/office/2006/metadata/properties" xmlns:xsi="http://www.w3.org/2001/XMLSchema-instance" xmlns:pc="http://schemas.microsoft.com/office/infopath/2007/PartnerControls">
+  <documentManagement>
+    <Status xmlns="71af3243-3dd4-4a8d-8c0d-dd76da1f02a5">Not started</Status>
+    <MediaServiceKeyPoints xmlns="71af3243-3dd4-4a8d-8c0d-dd76da1f02a5" xsi:nil="true"/>
+  </documentManagement>
+</p:properties>
 </file>
 
-<file path=customXml/itemProps2.xml><?xml version="1.0" encoding="utf-8"?>
-<ds:datastoreItem xmlns:ds="http://schemas.openxmlformats.org/officeDocument/2006/customXml" ds:itemID="{E7228C0C-F774-4270-99CB-314B07EBFBE7}">
-  <ds:schemaRefs>
-    <ds:schemaRef ds:uri="http://schemas.microsoft.com/office/2006/metadata/properties"/>
-    <ds:schemaRef ds:uri="http://schemas.microsoft.com/office/infopath/2007/PartnerControls"/>
-    <ds:schemaRef ds:uri="71af3243-3dd4-4a8d-8c0d-dd76da1f02a5"/>
-  </ds:schemaRefs>
-</ds:datastoreItem>
+<file path=customXml/item3.xml><?xml version="1.0" encoding="utf-8"?>
+<?mso-contentType ?>
+<FormTemplates xmlns="http://schemas.microsoft.com/sharepoint/v3/contenttype/forms">
+  <Display>DocumentLibraryForm</Display>
+  <Edit>DocumentLibraryForm</Edit>
+  <New>DocumentLibraryForm</New>
+</FormTemplates>
 </file>
 
-<file path=customXml/itemProps3.xml><?xml version="1.0" encoding="utf-8"?>
+<file path=customXml/itemProps1.xml><?xml version="1.0" encoding="utf-8"?>
 <ds:datastoreItem xmlns:ds="http://schemas.openxmlformats.org/officeDocument/2006/customXml" ds:itemID="{E4487CEA-7875-4327-875F-CA3B32E8009E}">
   <ds:schemaRefs>
     <ds:schemaRef ds:uri="http://schemas.microsoft.com/office/2006/metadata/contentType"/>
@@ -10637,4 +11581,22 @@
     <ds:schemaRef ds:uri="http://schemas.microsoft.com/internal/obd"/>
   </ds:schemaRefs>
 </ds:datastoreItem>
+</file>
+
+<file path=customXml/itemProps2.xml><?xml version="1.0" encoding="utf-8"?>
+<ds:datastoreItem xmlns:ds="http://schemas.openxmlformats.org/officeDocument/2006/customXml" ds:itemID="{E7228C0C-F774-4270-99CB-314B07EBFBE7}">
+  <ds:schemaRefs>
+    <ds:schemaRef ds:uri="http://schemas.microsoft.com/office/2006/metadata/properties"/>
+    <ds:schemaRef ds:uri="http://schemas.microsoft.com/office/infopath/2007/PartnerControls"/>
+    <ds:schemaRef ds:uri="71af3243-3dd4-4a8d-8c0d-dd76da1f02a5"/>
+  </ds:schemaRefs>
+</ds:datastoreItem>
+</file>
+
+<file path=customXml/itemProps3.xml><?xml version="1.0" encoding="utf-8"?>
+<ds:datastoreItem xmlns:ds="http://schemas.openxmlformats.org/officeDocument/2006/customXml" ds:itemID="{7745B92C-4D89-4324-B52D-E1F5F627B790}">
+  <ds:schemaRefs>
+    <ds:schemaRef ds:uri="http://schemas.microsoft.com/sharepoint/v3/contenttype/forms"/>
+  </ds:schemaRefs>
+</ds:datastoreItem>
 </file>
</xml_diff>